<commit_message>
add Algorithm 5. KeyDerivation, 6 AsymCipher
</commit_message>
<xml_diff>
--- a/Part1.Technology/Chapter3.Algorithm/Algorithm-fig-jp.pptx
+++ b/Part1.Technology/Chapter3.Algorithm/Algorithm-fig-jp.pptx
@@ -215,7 +215,7 @@
           <a:p>
             <a:fld id="{AA086654-FD2F-41F8-8F9E-4A5B5F3FCB68}" type="datetimeFigureOut">
               <a:rPr kumimoji="1" lang="ja-JP" altLang="en-US" smtClean="0"/>
-              <a:t>2021/3/27</a:t>
+              <a:t>2021/3/29</a:t>
             </a:fld>
             <a:endParaRPr kumimoji="1" lang="ja-JP" altLang="en-US"/>
           </a:p>
@@ -953,7 +953,7 @@
           <a:p>
             <a:fld id="{293B81DC-4102-FF40-B3FD-14093C4E3488}" type="datetimeFigureOut">
               <a:rPr kumimoji="1" lang="ja-JP" altLang="en-US" smtClean="0"/>
-              <a:t>2021/3/27</a:t>
+              <a:t>2021/3/29</a:t>
             </a:fld>
             <a:endParaRPr kumimoji="1" lang="ja-JP" altLang="en-US"/>
           </a:p>
@@ -1183,7 +1183,7 @@
           <a:p>
             <a:fld id="{293B81DC-4102-FF40-B3FD-14093C4E3488}" type="datetimeFigureOut">
               <a:rPr kumimoji="1" lang="ja-JP" altLang="en-US" smtClean="0"/>
-              <a:t>2021/3/27</a:t>
+              <a:t>2021/3/29</a:t>
             </a:fld>
             <a:endParaRPr kumimoji="1" lang="ja-JP" altLang="en-US"/>
           </a:p>
@@ -1423,7 +1423,7 @@
           <a:p>
             <a:fld id="{293B81DC-4102-FF40-B3FD-14093C4E3488}" type="datetimeFigureOut">
               <a:rPr kumimoji="1" lang="ja-JP" altLang="en-US" smtClean="0"/>
-              <a:t>2021/3/27</a:t>
+              <a:t>2021/3/29</a:t>
             </a:fld>
             <a:endParaRPr kumimoji="1" lang="ja-JP" altLang="en-US"/>
           </a:p>
@@ -1653,7 +1653,7 @@
           <a:p>
             <a:fld id="{293B81DC-4102-FF40-B3FD-14093C4E3488}" type="datetimeFigureOut">
               <a:rPr kumimoji="1" lang="ja-JP" altLang="en-US" smtClean="0"/>
-              <a:t>2021/3/27</a:t>
+              <a:t>2021/3/29</a:t>
             </a:fld>
             <a:endParaRPr kumimoji="1" lang="ja-JP" altLang="en-US"/>
           </a:p>
@@ -1928,7 +1928,7 @@
           <a:p>
             <a:fld id="{293B81DC-4102-FF40-B3FD-14093C4E3488}" type="datetimeFigureOut">
               <a:rPr kumimoji="1" lang="ja-JP" altLang="en-US" smtClean="0"/>
-              <a:t>2021/3/27</a:t>
+              <a:t>2021/3/29</a:t>
             </a:fld>
             <a:endParaRPr kumimoji="1" lang="ja-JP" altLang="en-US"/>
           </a:p>
@@ -2257,7 +2257,7 @@
           <a:p>
             <a:fld id="{293B81DC-4102-FF40-B3FD-14093C4E3488}" type="datetimeFigureOut">
               <a:rPr kumimoji="1" lang="ja-JP" altLang="en-US" smtClean="0"/>
-              <a:t>2021/3/27</a:t>
+              <a:t>2021/3/29</a:t>
             </a:fld>
             <a:endParaRPr kumimoji="1" lang="ja-JP" altLang="en-US"/>
           </a:p>
@@ -2733,7 +2733,7 @@
           <a:p>
             <a:fld id="{293B81DC-4102-FF40-B3FD-14093C4E3488}" type="datetimeFigureOut">
               <a:rPr kumimoji="1" lang="ja-JP" altLang="en-US" smtClean="0"/>
-              <a:t>2021/3/27</a:t>
+              <a:t>2021/3/29</a:t>
             </a:fld>
             <a:endParaRPr kumimoji="1" lang="ja-JP" altLang="en-US"/>
           </a:p>
@@ -2874,7 +2874,7 @@
           <a:p>
             <a:fld id="{293B81DC-4102-FF40-B3FD-14093C4E3488}" type="datetimeFigureOut">
               <a:rPr kumimoji="1" lang="ja-JP" altLang="en-US" smtClean="0"/>
-              <a:t>2021/3/27</a:t>
+              <a:t>2021/3/29</a:t>
             </a:fld>
             <a:endParaRPr kumimoji="1" lang="ja-JP" altLang="en-US"/>
           </a:p>
@@ -2987,7 +2987,7 @@
           <a:p>
             <a:fld id="{293B81DC-4102-FF40-B3FD-14093C4E3488}" type="datetimeFigureOut">
               <a:rPr kumimoji="1" lang="ja-JP" altLang="en-US" smtClean="0"/>
-              <a:t>2021/3/27</a:t>
+              <a:t>2021/3/29</a:t>
             </a:fld>
             <a:endParaRPr kumimoji="1" lang="ja-JP" altLang="en-US"/>
           </a:p>
@@ -3330,7 +3330,7 @@
           <a:p>
             <a:fld id="{293B81DC-4102-FF40-B3FD-14093C4E3488}" type="datetimeFigureOut">
               <a:rPr kumimoji="1" lang="ja-JP" altLang="en-US" smtClean="0"/>
-              <a:t>2021/3/27</a:t>
+              <a:t>2021/3/29</a:t>
             </a:fld>
             <a:endParaRPr kumimoji="1" lang="ja-JP" altLang="en-US"/>
           </a:p>
@@ -3618,7 +3618,7 @@
           <a:p>
             <a:fld id="{293B81DC-4102-FF40-B3FD-14093C4E3488}" type="datetimeFigureOut">
               <a:rPr kumimoji="1" lang="ja-JP" altLang="en-US" smtClean="0"/>
-              <a:t>2021/3/27</a:t>
+              <a:t>2021/3/29</a:t>
             </a:fld>
             <a:endParaRPr kumimoji="1" lang="ja-JP" altLang="en-US"/>
           </a:p>
@@ -3891,7 +3891,7 @@
           <a:p>
             <a:fld id="{293B81DC-4102-FF40-B3FD-14093C4E3488}" type="datetimeFigureOut">
               <a:rPr kumimoji="1" lang="ja-JP" altLang="en-US" smtClean="0"/>
-              <a:t>2021/3/27</a:t>
+              <a:t>2021/3/29</a:t>
             </a:fld>
             <a:endParaRPr kumimoji="1" lang="ja-JP" altLang="en-US"/>
           </a:p>
@@ -14620,7 +14620,7 @@
         </p:nvGrpSpPr>
         <p:grpSpPr>
           <a:xfrm flipH="1">
-            <a:off x="1673554" y="533762"/>
+            <a:off x="1392202" y="533762"/>
             <a:ext cx="10221456" cy="1775736"/>
             <a:chOff x="1673554" y="240684"/>
             <a:chExt cx="10221456" cy="1775736"/>
@@ -15639,10 +15639,10 @@
           </p:nvGrpSpPr>
           <p:grpSpPr>
             <a:xfrm>
-              <a:off x="10674804" y="1125120"/>
-              <a:ext cx="1220206" cy="376325"/>
-              <a:chOff x="5143350" y="596197"/>
-              <a:chExt cx="1220206" cy="376325"/>
+              <a:off x="10674804" y="1089951"/>
+              <a:ext cx="1220206" cy="411494"/>
+              <a:chOff x="5143350" y="561028"/>
+              <a:chExt cx="1220206" cy="411494"/>
             </a:xfrm>
           </p:grpSpPr>
           <p:sp>
@@ -15699,7 +15699,7 @@
             </p:nvSpPr>
             <p:spPr>
               <a:xfrm>
-                <a:off x="5520992" y="596197"/>
+                <a:off x="5591330" y="561028"/>
                 <a:ext cx="304892" cy="307777"/>
               </a:xfrm>
               <a:prstGeom prst="rect">
@@ -15736,10 +15736,10 @@
           </p:nvGrpSpPr>
           <p:grpSpPr>
             <a:xfrm>
-              <a:off x="1673554" y="1159923"/>
-              <a:ext cx="1399742" cy="376343"/>
-              <a:chOff x="5144636" y="485357"/>
-              <a:chExt cx="1399742" cy="376343"/>
+              <a:off x="1673554" y="1148200"/>
+              <a:ext cx="1399742" cy="388066"/>
+              <a:chOff x="5144636" y="473634"/>
+              <a:chExt cx="1399742" cy="388066"/>
             </a:xfrm>
           </p:grpSpPr>
           <p:sp>
@@ -15796,8 +15796,8 @@
             </p:nvSpPr>
             <p:spPr>
               <a:xfrm>
-                <a:off x="5687252" y="485357"/>
-                <a:ext cx="314510" cy="307777"/>
+                <a:off x="5609647" y="473634"/>
+                <a:ext cx="251439" cy="369332"/>
               </a:xfrm>
               <a:prstGeom prst="rect">
                 <a:avLst/>
@@ -15805,7 +15805,7 @@
               <a:noFill/>
             </p:spPr>
             <p:txBody>
-              <a:bodyPr wrap="none" rtlCol="0">
+              <a:bodyPr wrap="square" rtlCol="0">
                 <a:spAutoFit/>
               </a:bodyPr>
               <a:lstStyle/>
@@ -15834,7 +15834,7 @@
         </p:nvSpPr>
         <p:spPr>
           <a:xfrm>
-            <a:off x="798540" y="582584"/>
+            <a:off x="517188" y="582584"/>
             <a:ext cx="922047" cy="523220"/>
           </a:xfrm>
           <a:prstGeom prst="rect">
@@ -15899,7 +15899,7 @@
         </p:nvSpPr>
         <p:spPr>
           <a:xfrm>
-            <a:off x="2538324" y="1019513"/>
+            <a:off x="2538324" y="796776"/>
             <a:ext cx="2299855" cy="402441"/>
           </a:xfrm>
           <a:prstGeom prst="rect">
@@ -15989,7 +15989,7 @@
         </p:nvSpPr>
         <p:spPr>
           <a:xfrm>
-            <a:off x="8318136" y="1032485"/>
+            <a:off x="8318136" y="809748"/>
             <a:ext cx="2299855" cy="402441"/>
           </a:xfrm>
           <a:prstGeom prst="rect">
@@ -16043,7 +16043,7 @@
         </p:nvSpPr>
         <p:spPr>
           <a:xfrm>
-            <a:off x="2573902" y="1035635"/>
+            <a:off x="2573902" y="812898"/>
             <a:ext cx="2299855" cy="338554"/>
           </a:xfrm>
           <a:prstGeom prst="rect">
@@ -16083,7 +16083,7 @@
         </p:nvCxnSpPr>
         <p:spPr>
           <a:xfrm flipH="1">
-            <a:off x="4908970" y="1219851"/>
+            <a:off x="4908970" y="997114"/>
             <a:ext cx="3304520" cy="0"/>
           </a:xfrm>
           <a:prstGeom prst="straightConnector1">
@@ -16586,7 +16586,7 @@
         </p:nvSpPr>
         <p:spPr>
           <a:xfrm flipH="1">
-            <a:off x="4952281" y="1795322"/>
+            <a:off x="4999235" y="1795322"/>
             <a:ext cx="3214255" cy="1122218"/>
           </a:xfrm>
           <a:custGeom>
@@ -16862,7 +16862,7 @@
         </p:nvSpPr>
         <p:spPr>
           <a:xfrm rot="16200000" flipH="1">
-            <a:off x="9426989" y="1338011"/>
+            <a:off x="9426990" y="1232505"/>
             <a:ext cx="241087" cy="396424"/>
           </a:xfrm>
           <a:prstGeom prst="rightArrow">
@@ -16916,7 +16916,7 @@
         </p:nvSpPr>
         <p:spPr>
           <a:xfrm rot="16200000" flipH="1">
-            <a:off x="3606508" y="1338010"/>
+            <a:off x="3606508" y="1232503"/>
             <a:ext cx="241087" cy="396424"/>
           </a:xfrm>
           <a:prstGeom prst="rightArrow">
@@ -17412,10 +17412,10 @@
         </p:nvGrpSpPr>
         <p:grpSpPr>
           <a:xfrm>
-            <a:off x="7131217" y="1861888"/>
-            <a:ext cx="1637985" cy="688902"/>
-            <a:chOff x="8756918" y="4613091"/>
-            <a:chExt cx="1637985" cy="688902"/>
+            <a:off x="6735258" y="1342640"/>
+            <a:ext cx="2033966" cy="475843"/>
+            <a:chOff x="8458477" y="5111572"/>
+            <a:chExt cx="2033966" cy="475843"/>
           </a:xfrm>
         </p:grpSpPr>
         <p:sp>
@@ -17432,8 +17432,8 @@
           </p:nvSpPr>
           <p:spPr>
             <a:xfrm>
-              <a:off x="8756918" y="4778773"/>
-              <a:ext cx="1637985" cy="523220"/>
+              <a:off x="8458477" y="5248861"/>
+              <a:ext cx="2033966" cy="338554"/>
             </a:xfrm>
             <a:prstGeom prst="rect">
               <a:avLst/>
@@ -17447,28 +17447,17 @@
             <a:lstStyle/>
             <a:p>
               <a:r>
-                <a:rPr kumimoji="1" lang="en-US" altLang="ja-JP" dirty="0"/>
+                <a:rPr kumimoji="1" lang="en-US" altLang="ja-JP" sz="1600" dirty="0"/>
                 <a:t>Pa = G  </a:t>
               </a:r>
               <a:r>
-                <a:rPr kumimoji="1" lang="ja-JP" altLang="en-US" dirty="0"/>
+                <a:rPr kumimoji="1" lang="ja-JP" altLang="en-US" sz="1600" dirty="0"/>
                 <a:t>   </a:t>
               </a:r>
               <a:r>
-                <a:rPr kumimoji="1" lang="en-US" altLang="ja-JP" dirty="0"/>
+                <a:rPr kumimoji="1" lang="en-US" altLang="ja-JP" sz="1600" dirty="0"/>
                 <a:t>mod P</a:t>
               </a:r>
-            </a:p>
-            <a:p>
-              <a:r>
-                <a:rPr kumimoji="1" lang="en-US" altLang="ja-JP" dirty="0"/>
-                <a:t>Pa = </a:t>
-              </a:r>
-              <a:r>
-                <a:rPr kumimoji="1" lang="en-US" altLang="ja-JP" dirty="0" err="1"/>
-                <a:t>aG</a:t>
-              </a:r>
-              <a:endParaRPr kumimoji="1" lang="ja-JP" altLang="en-US" dirty="0"/>
             </a:p>
           </p:txBody>
         </p:sp>
@@ -17486,8 +17475,8 @@
           </p:nvSpPr>
           <p:spPr>
             <a:xfrm>
-              <a:off x="9336688" y="4613091"/>
-              <a:ext cx="522153" cy="307777"/>
+              <a:off x="9123793" y="5111572"/>
+              <a:ext cx="561655" cy="338554"/>
             </a:xfrm>
             <a:prstGeom prst="rect">
               <a:avLst/>
@@ -17501,10 +17490,10 @@
             <a:lstStyle/>
             <a:p>
               <a:r>
-                <a:rPr kumimoji="1" lang="en-US" altLang="ja-JP" dirty="0"/>
+                <a:rPr kumimoji="1" lang="en-US" altLang="ja-JP" sz="1600" dirty="0"/>
                 <a:t>A</a:t>
               </a:r>
-              <a:endParaRPr kumimoji="1" lang="ja-JP" altLang="en-US" dirty="0"/>
+              <a:endParaRPr kumimoji="1" lang="ja-JP" altLang="en-US" sz="1600" dirty="0"/>
             </a:p>
           </p:txBody>
         </p:sp>
@@ -17523,7 +17512,7 @@
         </p:nvSpPr>
         <p:spPr>
           <a:xfrm>
-            <a:off x="8436578" y="1064428"/>
+            <a:off x="8436578" y="841691"/>
             <a:ext cx="2299855" cy="338554"/>
           </a:xfrm>
           <a:prstGeom prst="rect">
@@ -17561,10 +17550,10 @@
         </p:nvGrpSpPr>
         <p:grpSpPr>
           <a:xfrm>
-            <a:off x="4769239" y="1867632"/>
-            <a:ext cx="1513556" cy="676537"/>
-            <a:chOff x="8738281" y="4613090"/>
-            <a:chExt cx="1513556" cy="676537"/>
+            <a:off x="4847280" y="1337577"/>
+            <a:ext cx="1758815" cy="465505"/>
+            <a:chOff x="8700587" y="4812347"/>
+            <a:chExt cx="1277108" cy="465505"/>
           </a:xfrm>
         </p:grpSpPr>
         <p:sp>
@@ -17581,8 +17570,8 @@
           </p:nvSpPr>
           <p:spPr>
             <a:xfrm>
-              <a:off x="8738281" y="4766407"/>
-              <a:ext cx="1513556" cy="523220"/>
+              <a:off x="8700587" y="4939298"/>
+              <a:ext cx="1277108" cy="338554"/>
             </a:xfrm>
             <a:prstGeom prst="rect">
               <a:avLst/>
@@ -17596,28 +17585,17 @@
             <a:lstStyle/>
             <a:p>
               <a:r>
-                <a:rPr kumimoji="1" lang="en-US" altLang="ja-JP" dirty="0"/>
+                <a:rPr kumimoji="1" lang="en-US" altLang="ja-JP" sz="1600" dirty="0"/>
                 <a:t>Pb = G  </a:t>
               </a:r>
               <a:r>
-                <a:rPr kumimoji="1" lang="ja-JP" altLang="en-US" dirty="0"/>
+                <a:rPr kumimoji="1" lang="ja-JP" altLang="en-US" sz="1600" dirty="0"/>
                 <a:t>   </a:t>
               </a:r>
               <a:r>
-                <a:rPr kumimoji="1" lang="en-US" altLang="ja-JP" dirty="0"/>
+                <a:rPr kumimoji="1" lang="en-US" altLang="ja-JP" sz="1600" dirty="0"/>
                 <a:t>mod P</a:t>
               </a:r>
-            </a:p>
-            <a:p>
-              <a:r>
-                <a:rPr kumimoji="1" lang="en-US" altLang="ja-JP" dirty="0"/>
-                <a:t>Pb = </a:t>
-              </a:r>
-              <a:r>
-                <a:rPr kumimoji="1" lang="en-US" altLang="ja-JP" dirty="0" err="1"/>
-                <a:t>bG</a:t>
-              </a:r>
-              <a:endParaRPr kumimoji="1" lang="en-US" altLang="ja-JP" dirty="0"/>
             </a:p>
           </p:txBody>
         </p:sp>
@@ -17635,8 +17613,8 @@
           </p:nvSpPr>
           <p:spPr>
             <a:xfrm>
-              <a:off x="9336701" y="4613090"/>
-              <a:ext cx="304892" cy="307777"/>
+              <a:off x="9196038" y="4812347"/>
+              <a:ext cx="276358" cy="338554"/>
             </a:xfrm>
             <a:prstGeom prst="rect">
               <a:avLst/>
@@ -17644,16 +17622,16 @@
             <a:noFill/>
           </p:spPr>
           <p:txBody>
-            <a:bodyPr wrap="none" rtlCol="0">
+            <a:bodyPr wrap="square" rtlCol="0">
               <a:spAutoFit/>
             </a:bodyPr>
             <a:lstStyle/>
             <a:p>
               <a:r>
-                <a:rPr kumimoji="1" lang="en-US" altLang="ja-JP" dirty="0"/>
+                <a:rPr kumimoji="1" lang="en-US" altLang="ja-JP" sz="1600" dirty="0"/>
                 <a:t>B</a:t>
               </a:r>
-              <a:endParaRPr kumimoji="1" lang="ja-JP" altLang="en-US" dirty="0"/>
+              <a:endParaRPr kumimoji="1" lang="ja-JP" altLang="en-US" sz="1600" dirty="0"/>
             </a:p>
           </p:txBody>
         </p:sp>
@@ -17736,7 +17714,7 @@
           </p:nvSpPr>
           <p:spPr>
             <a:xfrm>
-              <a:off x="8948763" y="4613090"/>
+              <a:off x="9032039" y="4613090"/>
               <a:ext cx="304892" cy="307777"/>
             </a:xfrm>
             <a:prstGeom prst="rect">
@@ -17773,10 +17751,10 @@
         </p:nvGrpSpPr>
         <p:grpSpPr>
           <a:xfrm>
-            <a:off x="1236333" y="2603699"/>
-            <a:ext cx="1170513" cy="431829"/>
-            <a:chOff x="8725794" y="4613090"/>
-            <a:chExt cx="1170513" cy="431829"/>
+            <a:off x="1096655" y="2603700"/>
+            <a:ext cx="1170513" cy="431828"/>
+            <a:chOff x="8725794" y="4613091"/>
+            <a:chExt cx="1170513" cy="431828"/>
           </a:xfrm>
         </p:grpSpPr>
         <p:sp>
@@ -17837,8 +17815,8 @@
           </p:nvSpPr>
           <p:spPr>
             <a:xfrm>
-              <a:off x="8948763" y="4613090"/>
-              <a:ext cx="304892" cy="307777"/>
+              <a:off x="9058832" y="4613091"/>
+              <a:ext cx="308161" cy="369332"/>
             </a:xfrm>
             <a:prstGeom prst="rect">
               <a:avLst/>
@@ -17846,7 +17824,7 @@
             <a:noFill/>
           </p:spPr>
           <p:txBody>
-            <a:bodyPr wrap="none" rtlCol="0">
+            <a:bodyPr wrap="square" rtlCol="0">
               <a:spAutoFit/>
             </a:bodyPr>
             <a:lstStyle/>
@@ -17874,7 +17852,7 @@
         </p:nvSpPr>
         <p:spPr>
           <a:xfrm>
-            <a:off x="5115773" y="2614797"/>
+            <a:off x="5115773" y="2874167"/>
             <a:ext cx="404278" cy="307777"/>
           </a:xfrm>
           <a:prstGeom prst="rect">
@@ -17910,7 +17888,7 @@
         </p:nvSpPr>
         <p:spPr>
           <a:xfrm>
-            <a:off x="7624096" y="2550863"/>
+            <a:off x="7624096" y="2852875"/>
             <a:ext cx="404278" cy="307777"/>
           </a:xfrm>
           <a:prstGeom prst="rect">
@@ -17947,42 +17925,6 @@
         <p:spPr>
           <a:xfrm>
             <a:off x="11487334" y="1714787"/>
-            <a:ext cx="304892" cy="307777"/>
-          </a:xfrm>
-          <a:prstGeom prst="rect">
-            <a:avLst/>
-          </a:prstGeom>
-          <a:noFill/>
-        </p:spPr>
-        <p:txBody>
-          <a:bodyPr wrap="none" rtlCol="0">
-            <a:spAutoFit/>
-          </a:bodyPr>
-          <a:lstStyle/>
-          <a:p>
-            <a:r>
-              <a:rPr kumimoji="1" lang="en-US" altLang="ja-JP" dirty="0"/>
-              <a:t>A</a:t>
-            </a:r>
-            <a:endParaRPr kumimoji="1" lang="ja-JP" altLang="en-US" dirty="0"/>
-          </a:p>
-        </p:txBody>
-      </p:sp>
-      <p:sp>
-        <p:nvSpPr>
-          <p:cNvPr id="97" name="テキスト ボックス 96">
-            <a:extLst>
-              <a:ext uri="{FF2B5EF4-FFF2-40B4-BE49-F238E27FC236}">
-                <a16:creationId xmlns:a16="http://schemas.microsoft.com/office/drawing/2014/main" id="{91730247-414F-48C1-8F00-38F9303E7AFC}"/>
-              </a:ext>
-            </a:extLst>
-          </p:cNvPr>
-          <p:cNvSpPr txBox="1"/>
-          <p:nvPr/>
-        </p:nvSpPr>
-        <p:spPr>
-          <a:xfrm>
-            <a:off x="11639734" y="1867187"/>
             <a:ext cx="304892" cy="307777"/>
           </a:xfrm>
           <a:prstGeom prst="rect">

</xml_diff>